<commit_message>
Lecture 10, participation survey, lecture 9 update
</commit_message>
<xml_diff>
--- a/lectures/09-Planning-Ex.pptx
+++ b/lectures/09-Planning-Ex.pptx
@@ -15,6 +15,7 @@
     <p:sldId id="264" r:id="rId9"/>
     <p:sldId id="266" r:id="rId10"/>
     <p:sldId id="265" r:id="rId11"/>
+    <p:sldId id="267" r:id="rId12"/>
   </p:sldIdLst>
   <p:sldSz cx="12192000" cy="6858000"/>
   <p:notesSz cx="6858000" cy="9144000"/>
@@ -126,6 +127,7 @@
   <p1510:revLst>
     <p1510:client id="{243EF6AA-BCC7-4D5D-8BF7-17F574617A46}" v="16" dt="2022-08-06T02:45:05.893"/>
     <p1510:client id="{A52D0795-9E8D-43C2-AE6F-F04C9E38C97D}" v="91" dt="2022-06-30T18:57:42.094"/>
+    <p1510:client id="{DDC18E44-2617-4B94-89FC-D3A725915BF6}" v="40" dt="2022-09-26T01:15:32.453"/>
     <p1510:client id="{E39C9D8A-111D-41F5-B261-5035D3AF97DC}" v="32" dt="2022-09-21T02:34:08.344"/>
     <p1510:client id="{FEFB274C-B274-487F-96D6-CF09D9B5598D}" v="2109" dt="2022-09-21T01:09:40.945"/>
   </p1510:revLst>
@@ -263,7 +265,7 @@
           <a:p>
             <a:fld id="{846CE7D5-CF57-46EF-B807-FDD0502418D4}" type="datetimeFigureOut">
               <a:rPr lang="en-US" smtClean="0"/>
-              <a:t>9/20/2022</a:t>
+              <a:t>9/25/2022</a:t>
             </a:fld>
             <a:endParaRPr lang="en-US"/>
           </a:p>
@@ -433,7 +435,7 @@
           <a:p>
             <a:fld id="{846CE7D5-CF57-46EF-B807-FDD0502418D4}" type="datetimeFigureOut">
               <a:rPr lang="en-US" smtClean="0"/>
-              <a:t>9/20/2022</a:t>
+              <a:t>9/25/2022</a:t>
             </a:fld>
             <a:endParaRPr lang="en-US"/>
           </a:p>
@@ -613,7 +615,7 @@
           <a:p>
             <a:fld id="{846CE7D5-CF57-46EF-B807-FDD0502418D4}" type="datetimeFigureOut">
               <a:rPr lang="en-US" smtClean="0"/>
-              <a:t>9/20/2022</a:t>
+              <a:t>9/25/2022</a:t>
             </a:fld>
             <a:endParaRPr lang="en-US"/>
           </a:p>
@@ -783,7 +785,7 @@
           <a:p>
             <a:fld id="{846CE7D5-CF57-46EF-B807-FDD0502418D4}" type="datetimeFigureOut">
               <a:rPr lang="en-US" smtClean="0"/>
-              <a:t>9/20/2022</a:t>
+              <a:t>9/25/2022</a:t>
             </a:fld>
             <a:endParaRPr lang="en-US"/>
           </a:p>
@@ -1029,7 +1031,7 @@
           <a:p>
             <a:fld id="{846CE7D5-CF57-46EF-B807-FDD0502418D4}" type="datetimeFigureOut">
               <a:rPr lang="en-US" smtClean="0"/>
-              <a:t>9/20/2022</a:t>
+              <a:t>9/25/2022</a:t>
             </a:fld>
             <a:endParaRPr lang="en-US"/>
           </a:p>
@@ -1261,7 +1263,7 @@
           <a:p>
             <a:fld id="{846CE7D5-CF57-46EF-B807-FDD0502418D4}" type="datetimeFigureOut">
               <a:rPr lang="en-US" smtClean="0"/>
-              <a:t>9/20/2022</a:t>
+              <a:t>9/25/2022</a:t>
             </a:fld>
             <a:endParaRPr lang="en-US"/>
           </a:p>
@@ -1628,7 +1630,7 @@
           <a:p>
             <a:fld id="{846CE7D5-CF57-46EF-B807-FDD0502418D4}" type="datetimeFigureOut">
               <a:rPr lang="en-US" smtClean="0"/>
-              <a:t>9/20/2022</a:t>
+              <a:t>9/25/2022</a:t>
             </a:fld>
             <a:endParaRPr lang="en-US"/>
           </a:p>
@@ -1746,7 +1748,7 @@
           <a:p>
             <a:fld id="{846CE7D5-CF57-46EF-B807-FDD0502418D4}" type="datetimeFigureOut">
               <a:rPr lang="en-US" smtClean="0"/>
-              <a:t>9/20/2022</a:t>
+              <a:t>9/25/2022</a:t>
             </a:fld>
             <a:endParaRPr lang="en-US"/>
           </a:p>
@@ -1841,7 +1843,7 @@
           <a:p>
             <a:fld id="{846CE7D5-CF57-46EF-B807-FDD0502418D4}" type="datetimeFigureOut">
               <a:rPr lang="en-US" smtClean="0"/>
-              <a:t>9/20/2022</a:t>
+              <a:t>9/25/2022</a:t>
             </a:fld>
             <a:endParaRPr lang="en-US"/>
           </a:p>
@@ -2118,7 +2120,7 @@
           <a:p>
             <a:fld id="{846CE7D5-CF57-46EF-B807-FDD0502418D4}" type="datetimeFigureOut">
               <a:rPr lang="en-US" smtClean="0"/>
-              <a:t>9/20/2022</a:t>
+              <a:t>9/25/2022</a:t>
             </a:fld>
             <a:endParaRPr lang="en-US"/>
           </a:p>
@@ -2375,7 +2377,7 @@
           <a:p>
             <a:fld id="{846CE7D5-CF57-46EF-B807-FDD0502418D4}" type="datetimeFigureOut">
               <a:rPr lang="en-US" smtClean="0"/>
-              <a:t>9/20/2022</a:t>
+              <a:t>9/25/2022</a:t>
             </a:fld>
             <a:endParaRPr lang="en-US"/>
           </a:p>
@@ -2588,7 +2590,7 @@
           <a:p>
             <a:fld id="{846CE7D5-CF57-46EF-B807-FDD0502418D4}" type="datetimeFigureOut">
               <a:rPr lang="en-US" smtClean="0"/>
-              <a:t>9/20/2022</a:t>
+              <a:t>9/25/2022</a:t>
             </a:fld>
             <a:endParaRPr lang="en-US"/>
           </a:p>
@@ -4193,6 +4195,140 @@
 </p:sld>
 </file>
 
+<file path=ppt/slides/slide11.xml><?xml version="1.0" encoding="utf-8"?>
+<p:sld xmlns:a="http://schemas.openxmlformats.org/drawingml/2006/main" xmlns:r="http://schemas.openxmlformats.org/officeDocument/2006/relationships" xmlns:p="http://schemas.openxmlformats.org/presentationml/2006/main">
+  <p:cSld>
+    <p:spTree>
+      <p:nvGrpSpPr>
+        <p:cNvPr id="1" name=""/>
+        <p:cNvGrpSpPr/>
+        <p:nvPr/>
+      </p:nvGrpSpPr>
+      <p:grpSpPr>
+        <a:xfrm>
+          <a:off x="0" y="0"/>
+          <a:ext cx="0" cy="0"/>
+          <a:chOff x="0" y="0"/>
+          <a:chExt cx="0" cy="0"/>
+        </a:xfrm>
+      </p:grpSpPr>
+      <p:sp>
+        <p:nvSpPr>
+          <p:cNvPr id="2" name="Title 1">
+            <a:extLst>
+              <a:ext uri="{FF2B5EF4-FFF2-40B4-BE49-F238E27FC236}">
+                <a16:creationId xmlns:a16="http://schemas.microsoft.com/office/drawing/2014/main" id="{2FBEBE7A-5C7A-C1FF-8367-1833B560D256}"/>
+              </a:ext>
+            </a:extLst>
+          </p:cNvPr>
+          <p:cNvSpPr>
+            <a:spLocks noGrp="1"/>
+          </p:cNvSpPr>
+          <p:nvPr>
+            <p:ph type="title"/>
+          </p:nvPr>
+        </p:nvSpPr>
+        <p:spPr/>
+        <p:txBody>
+          <a:bodyPr/>
+          <a:lstStyle/>
+          <a:p>
+            <a:r>
+              <a:rPr lang="en-US" dirty="0">
+                <a:cs typeface="Calibri Light"/>
+              </a:rPr>
+              <a:t>References</a:t>
+            </a:r>
+            <a:endParaRPr lang="en-US" dirty="0"/>
+          </a:p>
+        </p:txBody>
+      </p:sp>
+      <p:sp>
+        <p:nvSpPr>
+          <p:cNvPr id="3" name="Content Placeholder 2">
+            <a:extLst>
+              <a:ext uri="{FF2B5EF4-FFF2-40B4-BE49-F238E27FC236}">
+                <a16:creationId xmlns:a16="http://schemas.microsoft.com/office/drawing/2014/main" id="{403472E2-8D91-A454-8F54-A718C9DCFF76}"/>
+              </a:ext>
+            </a:extLst>
+          </p:cNvPr>
+          <p:cNvSpPr>
+            <a:spLocks noGrp="1"/>
+          </p:cNvSpPr>
+          <p:nvPr>
+            <p:ph idx="1"/>
+          </p:nvPr>
+        </p:nvSpPr>
+        <p:spPr/>
+        <p:txBody>
+          <a:bodyPr vert="horz" lIns="91440" tIns="45720" rIns="91440" bIns="45720" rtlCol="0" anchor="t">
+            <a:normAutofit/>
+          </a:bodyPr>
+          <a:lstStyle/>
+          <a:p>
+            <a:r>
+              <a:rPr lang="en-US" dirty="0">
+                <a:cs typeface="Calibri"/>
+                <a:hlinkClick r:id="rId2"/>
+              </a:rPr>
+              <a:t>How do you play Planning Poker? planningpoker.com. 2020.</a:t>
+            </a:r>
+          </a:p>
+          <a:p>
+            <a:r>
+              <a:rPr lang="en-US" dirty="0">
+                <a:cs typeface="Calibri"/>
+                <a:hlinkClick r:id="rId3"/>
+              </a:rPr>
+              <a:t>Flowchart Maker and Online Diagram Software. Draw.io. 2005-2022. JGraph Ltd.</a:t>
+            </a:r>
+            <a:endParaRPr lang="en-US" dirty="0">
+              <a:cs typeface="Calibri"/>
+            </a:endParaRPr>
+          </a:p>
+          <a:p>
+            <a:r>
+              <a:rPr lang="en-US" dirty="0">
+                <a:cs typeface="Calibri"/>
+                <a:hlinkClick r:id="rId4"/>
+              </a:rPr>
+              <a:t>Software Requirements Specification. Dr. Kirstie Hawkey. 2011. Dalhousie University.</a:t>
+            </a:r>
+            <a:endParaRPr lang="en-US" dirty="0">
+              <a:cs typeface="Calibri"/>
+            </a:endParaRPr>
+          </a:p>
+          <a:p>
+            <a:endParaRPr lang="en-US" dirty="0">
+              <a:cs typeface="Calibri"/>
+            </a:endParaRPr>
+          </a:p>
+          <a:p>
+            <a:r>
+              <a:rPr lang="en-US" i="1" dirty="0">
+                <a:cs typeface="Calibri"/>
+              </a:rPr>
+              <a:t>Reading for next lecture: Pressman Ch 9-11, Appendix 1</a:t>
+            </a:r>
+            <a:endParaRPr lang="en-US" dirty="0">
+              <a:cs typeface="Calibri"/>
+            </a:endParaRPr>
+          </a:p>
+        </p:txBody>
+      </p:sp>
+    </p:spTree>
+    <p:extLst>
+      <p:ext uri="{BB962C8B-B14F-4D97-AF65-F5344CB8AC3E}">
+        <p14:creationId xmlns:p14="http://schemas.microsoft.com/office/powerpoint/2010/main" val="3714968726"/>
+      </p:ext>
+    </p:extLst>
+  </p:cSld>
+  <p:clrMapOvr>
+    <a:masterClrMapping/>
+  </p:clrMapOvr>
+</p:sld>
+</file>
+
 <file path=ppt/slides/slide2.xml><?xml version="1.0" encoding="utf-8"?>
 <p:sld xmlns:a="http://schemas.openxmlformats.org/drawingml/2006/main" xmlns:r="http://schemas.openxmlformats.org/officeDocument/2006/relationships" xmlns:p="http://schemas.openxmlformats.org/presentationml/2006/main">
   <p:cSld>

</xml_diff>